<commit_message>
updated week 1 slides
</commit_message>
<xml_diff>
--- a/slides/cds431_week1_1.pptx
+++ b/slides/cds431_week1_1.pptx
@@ -5,7 +5,7 @@
     <p:sldMasterId id="2147483648" r:id="rId1"/>
   </p:sldMasterIdLst>
   <p:notesMasterIdLst>
-    <p:notesMasterId r:id="rId26"/>
+    <p:notesMasterId r:id="rId24"/>
   </p:notesMasterIdLst>
   <p:sldIdLst>
     <p:sldId id="257" r:id="rId2"/>
@@ -20,18 +20,16 @@
     <p:sldId id="492" r:id="rId11"/>
     <p:sldId id="266" r:id="rId12"/>
     <p:sldId id="268" r:id="rId13"/>
-    <p:sldId id="555" r:id="rId14"/>
-    <p:sldId id="269" r:id="rId15"/>
-    <p:sldId id="311" r:id="rId16"/>
-    <p:sldId id="476" r:id="rId17"/>
-    <p:sldId id="542" r:id="rId18"/>
-    <p:sldId id="545" r:id="rId19"/>
-    <p:sldId id="543" r:id="rId20"/>
-    <p:sldId id="548" r:id="rId21"/>
-    <p:sldId id="549" r:id="rId22"/>
-    <p:sldId id="544" r:id="rId23"/>
-    <p:sldId id="546" r:id="rId24"/>
-    <p:sldId id="547" r:id="rId25"/>
+    <p:sldId id="269" r:id="rId14"/>
+    <p:sldId id="311" r:id="rId15"/>
+    <p:sldId id="542" r:id="rId16"/>
+    <p:sldId id="545" r:id="rId17"/>
+    <p:sldId id="543" r:id="rId18"/>
+    <p:sldId id="548" r:id="rId19"/>
+    <p:sldId id="549" r:id="rId20"/>
+    <p:sldId id="544" r:id="rId21"/>
+    <p:sldId id="546" r:id="rId22"/>
+    <p:sldId id="547" r:id="rId23"/>
   </p:sldIdLst>
   <p:sldSz cx="12192000" cy="6858000"/>
   <p:notesSz cx="6858000" cy="9144000"/>
@@ -220,7 +218,7 @@
           <a:p>
             <a:fld id="{1F4A5611-EEF7-044D-BFB5-07D27E982F04}" type="datetimeFigureOut">
               <a:rPr lang="en-US" smtClean="0"/>
-              <a:t>3/17/22</a:t>
+              <a:t>3/27/22</a:t>
             </a:fld>
             <a:endParaRPr lang="en-US"/>
           </a:p>
@@ -993,7 +991,7 @@
           <a:p>
             <a:fld id="{AA0A589D-B577-494C-AEB5-A5D4F1908003}" type="slidenum">
               <a:rPr lang="en-US" smtClean="0"/>
-              <a:t>15</a:t>
+              <a:t>14</a:t>
             </a:fld>
             <a:endParaRPr lang="en-US"/>
           </a:p>
@@ -1056,7 +1054,10 @@
           <a:bodyPr/>
           <a:lstStyle/>
           <a:p>
-            <a:endParaRPr lang="en-US" dirty="0"/>
+            <a:r>
+              <a:rPr lang="en-US" dirty="0"/>
+              <a:t>Use example of articulation/speech sound disorders</a:t>
+            </a:r>
           </a:p>
         </p:txBody>
       </p:sp>
@@ -1067,7 +1068,7 @@
             <a:spLocks noGrp="1"/>
           </p:cNvSpPr>
           <p:nvPr>
-            <p:ph type="sldNum" sz="quarter" idx="10"/>
+            <p:ph type="sldNum" sz="quarter" idx="5"/>
           </p:nvPr>
         </p:nvSpPr>
         <p:spPr/>
@@ -1077,7 +1078,7 @@
           <a:p>
             <a:fld id="{AA0A589D-B577-494C-AEB5-A5D4F1908003}" type="slidenum">
               <a:rPr lang="en-US" smtClean="0"/>
-              <a:t>16</a:t>
+              <a:t>19</a:t>
             </a:fld>
             <a:endParaRPr lang="en-US"/>
           </a:p>
@@ -1086,7 +1087,7 @@
     </p:spTree>
     <p:extLst>
       <p:ext uri="{BB962C8B-B14F-4D97-AF65-F5344CB8AC3E}">
-        <p14:creationId xmlns:p14="http://schemas.microsoft.com/office/powerpoint/2010/main" val="2803014657"/>
+        <p14:creationId xmlns:p14="http://schemas.microsoft.com/office/powerpoint/2010/main" val="3511651722"/>
       </p:ext>
     </p:extLst>
   </p:cSld>
@@ -1142,7 +1143,13 @@
           <a:p>
             <a:r>
               <a:rPr lang="en-US" dirty="0"/>
-              <a:t>Use example of articulation/speech sound disorders</a:t>
+              <a:t>Personal behaviors or interactions used for engaging others</a:t>
+            </a:r>
+          </a:p>
+          <a:p>
+            <a:r>
+              <a:rPr lang="en-US" dirty="0"/>
+              <a:t>Fundamental core professional skills necessary for effective speech-language therapy</a:t>
             </a:r>
           </a:p>
         </p:txBody>
@@ -1164,100 +1171,7 @@
           <a:p>
             <a:fld id="{AA0A589D-B577-494C-AEB5-A5D4F1908003}" type="slidenum">
               <a:rPr lang="en-US" smtClean="0"/>
-              <a:t>21</a:t>
-            </a:fld>
-            <a:endParaRPr lang="en-US"/>
-          </a:p>
-        </p:txBody>
-      </p:sp>
-    </p:spTree>
-    <p:extLst>
-      <p:ext uri="{BB962C8B-B14F-4D97-AF65-F5344CB8AC3E}">
-        <p14:creationId xmlns:p14="http://schemas.microsoft.com/office/powerpoint/2010/main" val="3511651722"/>
-      </p:ext>
-    </p:extLst>
-  </p:cSld>
-  <p:clrMapOvr>
-    <a:masterClrMapping/>
-  </p:clrMapOvr>
-</p:notes>
-</file>
-
-<file path=ppt/notesSlides/notesSlide9.xml><?xml version="1.0" encoding="utf-8"?>
-<p:notes xmlns:a="http://schemas.openxmlformats.org/drawingml/2006/main" xmlns:r="http://schemas.openxmlformats.org/officeDocument/2006/relationships" xmlns:p="http://schemas.openxmlformats.org/presentationml/2006/main">
-  <p:cSld>
-    <p:spTree>
-      <p:nvGrpSpPr>
-        <p:cNvPr id="1" name=""/>
-        <p:cNvGrpSpPr/>
-        <p:nvPr/>
-      </p:nvGrpSpPr>
-      <p:grpSpPr>
-        <a:xfrm>
-          <a:off x="0" y="0"/>
-          <a:ext cx="0" cy="0"/>
-          <a:chOff x="0" y="0"/>
-          <a:chExt cx="0" cy="0"/>
-        </a:xfrm>
-      </p:grpSpPr>
-      <p:sp>
-        <p:nvSpPr>
-          <p:cNvPr id="2" name="Slide Image Placeholder 1"/>
-          <p:cNvSpPr>
-            <a:spLocks noGrp="1" noRot="1" noChangeAspect="1"/>
-          </p:cNvSpPr>
-          <p:nvPr>
-            <p:ph type="sldImg"/>
-          </p:nvPr>
-        </p:nvSpPr>
-        <p:spPr/>
-      </p:sp>
-      <p:sp>
-        <p:nvSpPr>
-          <p:cNvPr id="3" name="Notes Placeholder 2"/>
-          <p:cNvSpPr>
-            <a:spLocks noGrp="1"/>
-          </p:cNvSpPr>
-          <p:nvPr>
-            <p:ph type="body" idx="1"/>
-          </p:nvPr>
-        </p:nvSpPr>
-        <p:spPr/>
-        <p:txBody>
-          <a:bodyPr/>
-          <a:lstStyle/>
-          <a:p>
-            <a:r>
-              <a:rPr lang="en-US" dirty="0"/>
-              <a:t>Personal behaviors or interactions used for engaging others</a:t>
-            </a:r>
-          </a:p>
-          <a:p>
-            <a:r>
-              <a:rPr lang="en-US" dirty="0"/>
-              <a:t>Fundamental core professional skills necessary for effective speech-language therapy</a:t>
-            </a:r>
-          </a:p>
-        </p:txBody>
-      </p:sp>
-      <p:sp>
-        <p:nvSpPr>
-          <p:cNvPr id="4" name="Slide Number Placeholder 3"/>
-          <p:cNvSpPr>
-            <a:spLocks noGrp="1"/>
-          </p:cNvSpPr>
-          <p:nvPr>
-            <p:ph type="sldNum" sz="quarter" idx="5"/>
-          </p:nvPr>
-        </p:nvSpPr>
-        <p:spPr/>
-        <p:txBody>
-          <a:bodyPr/>
-          <a:lstStyle/>
-          <a:p>
-            <a:fld id="{AA0A589D-B577-494C-AEB5-A5D4F1908003}" type="slidenum">
-              <a:rPr lang="en-US" smtClean="0"/>
-              <a:t>22</a:t>
+              <a:t>20</a:t>
             </a:fld>
             <a:endParaRPr lang="en-US"/>
           </a:p>
@@ -1423,7 +1337,7 @@
           <a:p>
             <a:fld id="{5E7DC96F-1741-8345-8C72-8D49191F3F60}" type="datetimeFigureOut">
               <a:rPr lang="en-US" smtClean="0"/>
-              <a:t>3/17/22</a:t>
+              <a:t>3/27/22</a:t>
             </a:fld>
             <a:endParaRPr lang="en-US"/>
           </a:p>
@@ -1621,7 +1535,7 @@
           <a:p>
             <a:fld id="{5E7DC96F-1741-8345-8C72-8D49191F3F60}" type="datetimeFigureOut">
               <a:rPr lang="en-US" smtClean="0"/>
-              <a:t>3/17/22</a:t>
+              <a:t>3/27/22</a:t>
             </a:fld>
             <a:endParaRPr lang="en-US"/>
           </a:p>
@@ -1829,7 +1743,7 @@
           <a:p>
             <a:fld id="{5E7DC96F-1741-8345-8C72-8D49191F3F60}" type="datetimeFigureOut">
               <a:rPr lang="en-US" smtClean="0"/>
-              <a:t>3/17/22</a:t>
+              <a:t>3/27/22</a:t>
             </a:fld>
             <a:endParaRPr lang="en-US"/>
           </a:p>
@@ -2027,7 +1941,7 @@
           <a:p>
             <a:fld id="{5E7DC96F-1741-8345-8C72-8D49191F3F60}" type="datetimeFigureOut">
               <a:rPr lang="en-US" smtClean="0"/>
-              <a:t>3/17/22</a:t>
+              <a:t>3/27/22</a:t>
             </a:fld>
             <a:endParaRPr lang="en-US"/>
           </a:p>
@@ -2302,7 +2216,7 @@
           <a:p>
             <a:fld id="{5E7DC96F-1741-8345-8C72-8D49191F3F60}" type="datetimeFigureOut">
               <a:rPr lang="en-US" smtClean="0"/>
-              <a:t>3/17/22</a:t>
+              <a:t>3/27/22</a:t>
             </a:fld>
             <a:endParaRPr lang="en-US"/>
           </a:p>
@@ -2567,7 +2481,7 @@
           <a:p>
             <a:fld id="{5E7DC96F-1741-8345-8C72-8D49191F3F60}" type="datetimeFigureOut">
               <a:rPr lang="en-US" smtClean="0"/>
-              <a:t>3/17/22</a:t>
+              <a:t>3/27/22</a:t>
             </a:fld>
             <a:endParaRPr lang="en-US"/>
           </a:p>
@@ -2979,7 +2893,7 @@
           <a:p>
             <a:fld id="{5E7DC96F-1741-8345-8C72-8D49191F3F60}" type="datetimeFigureOut">
               <a:rPr lang="en-US" smtClean="0"/>
-              <a:t>3/17/22</a:t>
+              <a:t>3/27/22</a:t>
             </a:fld>
             <a:endParaRPr lang="en-US"/>
           </a:p>
@@ -3120,7 +3034,7 @@
           <a:p>
             <a:fld id="{5E7DC96F-1741-8345-8C72-8D49191F3F60}" type="datetimeFigureOut">
               <a:rPr lang="en-US" smtClean="0"/>
-              <a:t>3/17/22</a:t>
+              <a:t>3/27/22</a:t>
             </a:fld>
             <a:endParaRPr lang="en-US"/>
           </a:p>
@@ -3233,7 +3147,7 @@
           <a:p>
             <a:fld id="{5E7DC96F-1741-8345-8C72-8D49191F3F60}" type="datetimeFigureOut">
               <a:rPr lang="en-US" smtClean="0"/>
-              <a:t>3/17/22</a:t>
+              <a:t>3/27/22</a:t>
             </a:fld>
             <a:endParaRPr lang="en-US"/>
           </a:p>
@@ -3544,7 +3458,7 @@
           <a:p>
             <a:fld id="{5E7DC96F-1741-8345-8C72-8D49191F3F60}" type="datetimeFigureOut">
               <a:rPr lang="en-US" smtClean="0"/>
-              <a:t>3/17/22</a:t>
+              <a:t>3/27/22</a:t>
             </a:fld>
             <a:endParaRPr lang="en-US"/>
           </a:p>
@@ -3832,7 +3746,7 @@
           <a:p>
             <a:fld id="{5E7DC96F-1741-8345-8C72-8D49191F3F60}" type="datetimeFigureOut">
               <a:rPr lang="en-US" smtClean="0"/>
-              <a:t>3/17/22</a:t>
+              <a:t>3/27/22</a:t>
             </a:fld>
             <a:endParaRPr lang="en-US"/>
           </a:p>
@@ -4103,7 +4017,7 @@
           <a:p>
             <a:fld id="{5E7DC96F-1741-8345-8C72-8D49191F3F60}" type="datetimeFigureOut">
               <a:rPr lang="en-US" smtClean="0"/>
-              <a:t>3/17/22</a:t>
+              <a:t>3/27/22</a:t>
             </a:fld>
             <a:endParaRPr lang="en-US"/>
           </a:p>
@@ -5414,616 +5328,102 @@
       </p:grpSpPr>
       <p:sp>
         <p:nvSpPr>
-          <p:cNvPr id="2" name="Title 1">
-            <a:extLst>
-              <a:ext uri="{FF2B5EF4-FFF2-40B4-BE49-F238E27FC236}">
-                <a16:creationId xmlns:a16="http://schemas.microsoft.com/office/drawing/2014/main" id="{A8FC17FD-A000-984F-B3C3-77E7699432F9}"/>
-              </a:ext>
-            </a:extLst>
-          </p:cNvPr>
+          <p:cNvPr id="2" name="Title 1"/>
           <p:cNvSpPr>
             <a:spLocks noGrp="1"/>
           </p:cNvSpPr>
           <p:nvPr>
             <p:ph type="title"/>
+          </p:nvPr>
+        </p:nvSpPr>
+        <p:spPr/>
+        <p:txBody>
+          <a:bodyPr/>
+          <a:lstStyle/>
+          <a:p>
+            <a:r>
+              <a:rPr lang="en-US" dirty="0"/>
+              <a:t>Office Hours</a:t>
+            </a:r>
+          </a:p>
+        </p:txBody>
+      </p:sp>
+      <p:sp>
+        <p:nvSpPr>
+          <p:cNvPr id="3" name="Content Placeholder 2"/>
+          <p:cNvSpPr>
+            <a:spLocks noGrp="1"/>
+          </p:cNvSpPr>
+          <p:nvPr>
+            <p:ph idx="1"/>
           </p:nvPr>
         </p:nvSpPr>
         <p:spPr>
           <a:xfrm>
-            <a:off x="1988796" y="18256"/>
-            <a:ext cx="7886700" cy="1325563"/>
+            <a:off x="1441174" y="1534738"/>
+            <a:ext cx="8736173" cy="4351338"/>
           </a:xfrm>
         </p:spPr>
         <p:txBody>
           <a:bodyPr/>
-          <a:lstStyle/>
-          <a:p>
-            <a:r>
-              <a:rPr lang="en-US" b="1" dirty="0"/>
-              <a:t>Participation Points</a:t>
-            </a:r>
-          </a:p>
-        </p:txBody>
-      </p:sp>
-      <p:sp>
-        <p:nvSpPr>
-          <p:cNvPr id="3" name="Content Placeholder 2">
-            <a:extLst>
-              <a:ext uri="{FF2B5EF4-FFF2-40B4-BE49-F238E27FC236}">
-                <a16:creationId xmlns:a16="http://schemas.microsoft.com/office/drawing/2014/main" id="{657FB552-DB01-2D43-999D-D14B0BECC4B3}"/>
-              </a:ext>
-            </a:extLst>
-          </p:cNvPr>
-          <p:cNvSpPr>
-            <a:spLocks noGrp="1"/>
-          </p:cNvSpPr>
-          <p:nvPr>
-            <p:ph idx="1"/>
-          </p:nvPr>
-        </p:nvSpPr>
-        <p:spPr>
-          <a:xfrm>
-            <a:off x="348343" y="1018572"/>
-            <a:ext cx="11437257" cy="1492399"/>
-          </a:xfrm>
-        </p:spPr>
-        <p:txBody>
-          <a:bodyPr>
-            <a:normAutofit/>
-          </a:bodyPr>
           <a:lstStyle/>
           <a:p>
             <a:pPr marL="0" indent="0">
               <a:buNone/>
             </a:pPr>
             <a:r>
+              <a:rPr lang="en-US" sz="2400" b="1" dirty="0"/>
+              <a:t>Tuesdays 10:00-11:30</a:t>
+            </a:r>
+          </a:p>
+          <a:p>
+            <a:pPr marL="0" indent="0">
+              <a:buNone/>
+            </a:pPr>
+            <a:r>
+              <a:rPr lang="en-US" sz="2400" b="1" dirty="0"/>
+              <a:t>	</a:t>
+            </a:r>
+            <a:r>
               <a:rPr lang="en-US" sz="2400" dirty="0"/>
-              <a:t> Participation points will be part of your grade.  I will average the participation points awarded by your group members and add point(s) for whole group participation (up to 2 points). Whole group participation could include: being the reporter for your breakout group; responding to questions; asking questions; or making comments.</a:t>
-            </a:r>
-          </a:p>
-          <a:p>
-            <a:endParaRPr lang="en-US" sz="2400" dirty="0"/>
-          </a:p>
-        </p:txBody>
-      </p:sp>
-      <p:graphicFrame>
-        <p:nvGraphicFramePr>
-          <p:cNvPr id="4" name="Table 3">
-            <a:extLst>
-              <a:ext uri="{FF2B5EF4-FFF2-40B4-BE49-F238E27FC236}">
-                <a16:creationId xmlns:a16="http://schemas.microsoft.com/office/drawing/2014/main" id="{30C78A3C-FE77-3E4D-8EEB-744BFCA09212}"/>
-              </a:ext>
-            </a:extLst>
-          </p:cNvPr>
-          <p:cNvGraphicFramePr>
-            <a:graphicFrameLocks noGrp="1"/>
-          </p:cNvGraphicFramePr>
-          <p:nvPr>
-            <p:extLst>
-              <p:ext uri="{D42A27DB-BD31-4B8C-83A1-F6EECF244321}">
-                <p14:modId xmlns:p14="http://schemas.microsoft.com/office/powerpoint/2010/main" val="2650757894"/>
-              </p:ext>
-            </p:extLst>
-          </p:nvPr>
-        </p:nvGraphicFramePr>
-        <p:xfrm>
-          <a:off x="1662804" y="2510971"/>
-          <a:ext cx="8808334" cy="4230547"/>
-        </p:xfrm>
-        <a:graphic>
-          <a:graphicData uri="http://schemas.openxmlformats.org/drawingml/2006/table">
-            <a:tbl>
-              <a:tblPr firstRow="1" firstCol="1" bandRow="1">
-                <a:tableStyleId>{5C22544A-7EE6-4342-B048-85BDC9FD1C3A}</a:tableStyleId>
-              </a:tblPr>
-              <a:tblGrid>
-                <a:gridCol w="588793">
-                  <a:extLst>
-                    <a:ext uri="{9D8B030D-6E8A-4147-A177-3AD203B41FA5}">
-                      <a16:colId xmlns:a16="http://schemas.microsoft.com/office/drawing/2014/main" val="1243761479"/>
-                    </a:ext>
-                  </a:extLst>
-                </a:gridCol>
-                <a:gridCol w="8219541">
-                  <a:extLst>
-                    <a:ext uri="{9D8B030D-6E8A-4147-A177-3AD203B41FA5}">
-                      <a16:colId xmlns:a16="http://schemas.microsoft.com/office/drawing/2014/main" val="332773551"/>
-                    </a:ext>
-                  </a:extLst>
-                </a:gridCol>
-              </a:tblGrid>
-              <a:tr h="390067">
-                <a:tc>
-                  <a:txBody>
-                    <a:bodyPr/>
-                    <a:lstStyle/>
-                    <a:p>
-                      <a:pPr marL="0" marR="0" algn="ctr">
-                        <a:spcBef>
-                          <a:spcPts val="0"/>
-                        </a:spcBef>
-                        <a:spcAft>
-                          <a:spcPts val="0"/>
-                        </a:spcAft>
-                      </a:pPr>
-                      <a:r>
-                        <a:rPr lang="en-US" sz="1000">
-                          <a:effectLst/>
-                        </a:rPr>
-                        <a:t>Points</a:t>
-                      </a:r>
-                      <a:endParaRPr lang="en-US" sz="1200">
-                        <a:effectLst/>
-                        <a:latin typeface="Calibri" panose="020F0502020204030204" pitchFamily="34" charset="0"/>
-                        <a:ea typeface="Calibri" panose="020F0502020204030204" pitchFamily="34" charset="0"/>
-                        <a:cs typeface="Times New Roman" panose="02020603050405020304" pitchFamily="18" charset="0"/>
-                      </a:endParaRPr>
-                    </a:p>
-                  </a:txBody>
-                  <a:tcPr marL="68580" marR="68580" marT="0" marB="0"/>
-                </a:tc>
-                <a:tc>
-                  <a:txBody>
-                    <a:bodyPr/>
-                    <a:lstStyle/>
-                    <a:p>
-                      <a:pPr marL="0" marR="0" algn="ctr">
-                        <a:spcBef>
-                          <a:spcPts val="0"/>
-                        </a:spcBef>
-                        <a:spcAft>
-                          <a:spcPts val="0"/>
-                        </a:spcAft>
-                      </a:pPr>
-                      <a:r>
-                        <a:rPr lang="en-US" sz="1000" dirty="0">
-                          <a:effectLst/>
-                        </a:rPr>
-                        <a:t>Descriptors</a:t>
-                      </a:r>
-                      <a:endParaRPr lang="en-US" sz="1200" dirty="0">
-                        <a:effectLst/>
-                        <a:latin typeface="Calibri" panose="020F0502020204030204" pitchFamily="34" charset="0"/>
-                        <a:ea typeface="Calibri" panose="020F0502020204030204" pitchFamily="34" charset="0"/>
-                        <a:cs typeface="Times New Roman" panose="02020603050405020304" pitchFamily="18" charset="0"/>
-                      </a:endParaRPr>
-                    </a:p>
-                  </a:txBody>
-                  <a:tcPr marL="68580" marR="68580" marT="0" marB="0"/>
-                </a:tc>
-                <a:extLst>
-                  <a:ext uri="{0D108BD9-81ED-4DB2-BD59-A6C34878D82A}">
-                    <a16:rowId xmlns:a16="http://schemas.microsoft.com/office/drawing/2014/main" val="411375180"/>
-                  </a:ext>
-                </a:extLst>
-              </a:tr>
-              <a:tr h="1170200">
-                <a:tc>
-                  <a:txBody>
-                    <a:bodyPr/>
-                    <a:lstStyle/>
-                    <a:p>
-                      <a:pPr marL="0" marR="0" algn="ctr">
-                        <a:spcBef>
-                          <a:spcPts val="0"/>
-                        </a:spcBef>
-                        <a:spcAft>
-                          <a:spcPts val="0"/>
-                        </a:spcAft>
-                      </a:pPr>
-                      <a:r>
-                        <a:rPr lang="en-US" sz="1000">
-                          <a:effectLst/>
-                        </a:rPr>
-                        <a:t>2</a:t>
-                      </a:r>
-                      <a:endParaRPr lang="en-US" sz="1200">
-                        <a:effectLst/>
-                        <a:latin typeface="Calibri" panose="020F0502020204030204" pitchFamily="34" charset="0"/>
-                        <a:ea typeface="Calibri" panose="020F0502020204030204" pitchFamily="34" charset="0"/>
-                        <a:cs typeface="Times New Roman" panose="02020603050405020304" pitchFamily="18" charset="0"/>
-                      </a:endParaRPr>
-                    </a:p>
-                  </a:txBody>
-                  <a:tcPr marL="68580" marR="68580" marT="0" marB="0"/>
-                </a:tc>
-                <a:tc>
-                  <a:txBody>
-                    <a:bodyPr/>
-                    <a:lstStyle/>
-                    <a:p>
-                      <a:pPr marL="0" marR="0">
-                        <a:spcBef>
-                          <a:spcPts val="0"/>
-                        </a:spcBef>
-                        <a:spcAft>
-                          <a:spcPts val="0"/>
-                        </a:spcAft>
-                      </a:pPr>
-                      <a:r>
-                        <a:rPr lang="en-US" sz="1400">
-                          <a:effectLst/>
-                        </a:rPr>
-                        <a:t>Active participant showing a balance between listening, initiating, and focusing discussion.</a:t>
-                      </a:r>
-                    </a:p>
-                    <a:p>
-                      <a:pPr marL="0" marR="0">
-                        <a:spcBef>
-                          <a:spcPts val="0"/>
-                        </a:spcBef>
-                        <a:spcAft>
-                          <a:spcPts val="0"/>
-                        </a:spcAft>
-                      </a:pPr>
-                      <a:r>
-                        <a:rPr lang="en-US" sz="1400">
-                          <a:effectLst/>
-                        </a:rPr>
-                        <a:t>Understands the purpose of the discussion and keeps the discussion focused and on topic.</a:t>
-                      </a:r>
-                    </a:p>
-                    <a:p>
-                      <a:pPr marL="0" marR="0">
-                        <a:spcBef>
-                          <a:spcPts val="0"/>
-                        </a:spcBef>
-                        <a:spcAft>
-                          <a:spcPts val="0"/>
-                        </a:spcAft>
-                      </a:pPr>
-                      <a:r>
-                        <a:rPr lang="en-US" sz="1400">
-                          <a:effectLst/>
-                        </a:rPr>
-                        <a:t>Consistently prepared for the discussion.</a:t>
-                      </a:r>
-                    </a:p>
-                    <a:p>
-                      <a:pPr marL="0" marR="0">
-                        <a:spcBef>
-                          <a:spcPts val="0"/>
-                        </a:spcBef>
-                        <a:spcAft>
-                          <a:spcPts val="0"/>
-                        </a:spcAft>
-                      </a:pPr>
-                      <a:r>
-                        <a:rPr lang="en-US" sz="1400">
-                          <a:effectLst/>
-                        </a:rPr>
-                        <a:t>Rarely absent.</a:t>
-                      </a:r>
-                    </a:p>
-                    <a:p>
-                      <a:pPr marL="0" marR="0">
-                        <a:spcBef>
-                          <a:spcPts val="0"/>
-                        </a:spcBef>
-                        <a:spcAft>
-                          <a:spcPts val="0"/>
-                        </a:spcAft>
-                      </a:pPr>
-                      <a:r>
-                        <a:rPr lang="en-US" sz="1400">
-                          <a:effectLst/>
-                        </a:rPr>
-                        <a:t>Positive attitude.</a:t>
-                      </a:r>
-                    </a:p>
-                    <a:p>
-                      <a:pPr marL="0" marR="0">
-                        <a:spcBef>
-                          <a:spcPts val="0"/>
-                        </a:spcBef>
-                        <a:spcAft>
-                          <a:spcPts val="0"/>
-                        </a:spcAft>
-                      </a:pPr>
-                      <a:r>
-                        <a:rPr lang="en-US" sz="1400">
-                          <a:effectLst/>
-                        </a:rPr>
-                        <a:t> </a:t>
-                      </a:r>
-                      <a:endParaRPr lang="en-US" sz="1400">
-                        <a:effectLst/>
-                        <a:latin typeface="Calibri" panose="020F0502020204030204" pitchFamily="34" charset="0"/>
-                        <a:ea typeface="Calibri" panose="020F0502020204030204" pitchFamily="34" charset="0"/>
-                        <a:cs typeface="Times New Roman" panose="02020603050405020304" pitchFamily="18" charset="0"/>
-                      </a:endParaRPr>
-                    </a:p>
-                  </a:txBody>
-                  <a:tcPr marL="68580" marR="68580" marT="0" marB="0"/>
-                </a:tc>
-                <a:extLst>
-                  <a:ext uri="{0D108BD9-81ED-4DB2-BD59-A6C34878D82A}">
-                    <a16:rowId xmlns:a16="http://schemas.microsoft.com/office/drawing/2014/main" val="241585793"/>
-                  </a:ext>
-                </a:extLst>
-              </a:tr>
-              <a:tr h="1560267">
-                <a:tc>
-                  <a:txBody>
-                    <a:bodyPr/>
-                    <a:lstStyle/>
-                    <a:p>
-                      <a:pPr marL="0" marR="0" algn="ctr">
-                        <a:spcBef>
-                          <a:spcPts val="0"/>
-                        </a:spcBef>
-                        <a:spcAft>
-                          <a:spcPts val="0"/>
-                        </a:spcAft>
-                      </a:pPr>
-                      <a:r>
-                        <a:rPr lang="en-US" sz="1000">
-                          <a:effectLst/>
-                        </a:rPr>
-                        <a:t>1</a:t>
-                      </a:r>
-                      <a:endParaRPr lang="en-US" sz="1200">
-                        <a:effectLst/>
-                        <a:latin typeface="Calibri" panose="020F0502020204030204" pitchFamily="34" charset="0"/>
-                        <a:ea typeface="Calibri" panose="020F0502020204030204" pitchFamily="34" charset="0"/>
-                        <a:cs typeface="Times New Roman" panose="02020603050405020304" pitchFamily="18" charset="0"/>
-                      </a:endParaRPr>
-                    </a:p>
-                  </a:txBody>
-                  <a:tcPr marL="68580" marR="68580" marT="0" marB="0"/>
-                </a:tc>
-                <a:tc>
-                  <a:txBody>
-                    <a:bodyPr/>
-                    <a:lstStyle/>
-                    <a:p>
-                      <a:pPr marL="0" marR="0">
-                        <a:spcBef>
-                          <a:spcPts val="0"/>
-                        </a:spcBef>
-                        <a:spcAft>
-                          <a:spcPts val="0"/>
-                        </a:spcAft>
-                      </a:pPr>
-                      <a:r>
-                        <a:rPr lang="en-US" sz="1400" dirty="0">
-                          <a:effectLst/>
-                        </a:rPr>
-                        <a:t>Is an active listener but defers easily to others.  OR  Active participant, but dominates the discussion rather than involving everyone.</a:t>
-                      </a:r>
-                    </a:p>
-                    <a:p>
-                      <a:pPr marL="0" marR="0">
-                        <a:spcBef>
-                          <a:spcPts val="0"/>
-                        </a:spcBef>
-                        <a:spcAft>
-                          <a:spcPts val="0"/>
-                        </a:spcAft>
-                      </a:pPr>
-                      <a:r>
-                        <a:rPr lang="en-US" sz="1400" dirty="0">
-                          <a:effectLst/>
-                        </a:rPr>
-                        <a:t>Relies on other group members to come to conclusions.  OR  Does not consider differing viewpoints.</a:t>
-                      </a:r>
-                    </a:p>
-                    <a:p>
-                      <a:pPr marL="0" marR="0">
-                        <a:spcBef>
-                          <a:spcPts val="0"/>
-                        </a:spcBef>
-                        <a:spcAft>
-                          <a:spcPts val="0"/>
-                        </a:spcAft>
-                      </a:pPr>
-                      <a:r>
-                        <a:rPr lang="en-US" sz="1400" dirty="0">
-                          <a:effectLst/>
-                        </a:rPr>
-                        <a:t>Occasional absences (2 or fewer in past 4 weeks)</a:t>
-                      </a:r>
-                    </a:p>
-                    <a:p>
-                      <a:pPr marL="0" marR="0">
-                        <a:spcBef>
-                          <a:spcPts val="0"/>
-                        </a:spcBef>
-                        <a:spcAft>
-                          <a:spcPts val="0"/>
-                        </a:spcAft>
-                      </a:pPr>
-                      <a:r>
-                        <a:rPr lang="en-US" sz="1400" dirty="0">
-                          <a:effectLst/>
-                        </a:rPr>
-                        <a:t>Is not consistently prepared for discussion.</a:t>
-                      </a:r>
-                    </a:p>
-                    <a:p>
-                      <a:pPr marL="0" marR="0">
-                        <a:spcBef>
-                          <a:spcPts val="0"/>
-                        </a:spcBef>
-                        <a:spcAft>
-                          <a:spcPts val="0"/>
-                        </a:spcAft>
-                      </a:pPr>
-                      <a:r>
-                        <a:rPr lang="en-US" sz="1400" dirty="0">
-                          <a:effectLst/>
-                        </a:rPr>
-                        <a:t>Positive attitude.</a:t>
-                      </a:r>
-                    </a:p>
-                    <a:p>
-                      <a:pPr marL="0" marR="0">
-                        <a:spcBef>
-                          <a:spcPts val="0"/>
-                        </a:spcBef>
-                        <a:spcAft>
-                          <a:spcPts val="0"/>
-                        </a:spcAft>
-                      </a:pPr>
-                      <a:r>
-                        <a:rPr lang="en-US" sz="1400" dirty="0">
-                          <a:effectLst/>
-                        </a:rPr>
-                        <a:t> </a:t>
-                      </a:r>
-                    </a:p>
-                    <a:p>
-                      <a:pPr marL="0" marR="0">
-                        <a:spcBef>
-                          <a:spcPts val="0"/>
-                        </a:spcBef>
-                        <a:spcAft>
-                          <a:spcPts val="0"/>
-                        </a:spcAft>
-                      </a:pPr>
-                      <a:r>
-                        <a:rPr lang="en-US" sz="1400" dirty="0">
-                          <a:effectLst/>
-                        </a:rPr>
-                        <a:t> </a:t>
-                      </a:r>
-                      <a:endParaRPr lang="en-US" sz="1400" dirty="0">
-                        <a:effectLst/>
-                        <a:latin typeface="Calibri" panose="020F0502020204030204" pitchFamily="34" charset="0"/>
-                        <a:ea typeface="Calibri" panose="020F0502020204030204" pitchFamily="34" charset="0"/>
-                        <a:cs typeface="Times New Roman" panose="02020603050405020304" pitchFamily="18" charset="0"/>
-                      </a:endParaRPr>
-                    </a:p>
-                  </a:txBody>
-                  <a:tcPr marL="68580" marR="68580" marT="0" marB="0"/>
-                </a:tc>
-                <a:extLst>
-                  <a:ext uri="{0D108BD9-81ED-4DB2-BD59-A6C34878D82A}">
-                    <a16:rowId xmlns:a16="http://schemas.microsoft.com/office/drawing/2014/main" val="3161579309"/>
-                  </a:ext>
-                </a:extLst>
-              </a:tr>
-              <a:tr h="780134">
-                <a:tc>
-                  <a:txBody>
-                    <a:bodyPr/>
-                    <a:lstStyle/>
-                    <a:p>
-                      <a:pPr marL="0" marR="0" algn="ctr">
-                        <a:spcBef>
-                          <a:spcPts val="0"/>
-                        </a:spcBef>
-                        <a:spcAft>
-                          <a:spcPts val="0"/>
-                        </a:spcAft>
-                      </a:pPr>
-                      <a:r>
-                        <a:rPr lang="en-US" sz="1000">
-                          <a:effectLst/>
-                        </a:rPr>
-                        <a:t>0</a:t>
-                      </a:r>
-                      <a:endParaRPr lang="en-US" sz="1200">
-                        <a:effectLst/>
-                        <a:latin typeface="Calibri" panose="020F0502020204030204" pitchFamily="34" charset="0"/>
-                        <a:ea typeface="Calibri" panose="020F0502020204030204" pitchFamily="34" charset="0"/>
-                        <a:cs typeface="Times New Roman" panose="02020603050405020304" pitchFamily="18" charset="0"/>
-                      </a:endParaRPr>
-                    </a:p>
-                  </a:txBody>
-                  <a:tcPr marL="68580" marR="68580" marT="0" marB="0"/>
-                </a:tc>
-                <a:tc>
-                  <a:txBody>
-                    <a:bodyPr/>
-                    <a:lstStyle/>
-                    <a:p>
-                      <a:pPr marL="0" marR="0">
-                        <a:spcBef>
-                          <a:spcPts val="0"/>
-                        </a:spcBef>
-                        <a:spcAft>
-                          <a:spcPts val="0"/>
-                        </a:spcAft>
-                      </a:pPr>
-                      <a:r>
-                        <a:rPr lang="en-US" sz="1400" dirty="0">
-                          <a:effectLst/>
-                        </a:rPr>
-                        <a:t>Negative attitude.</a:t>
-                      </a:r>
-                    </a:p>
-                    <a:p>
-                      <a:pPr marL="0" marR="0">
-                        <a:spcBef>
-                          <a:spcPts val="0"/>
-                        </a:spcBef>
-                        <a:spcAft>
-                          <a:spcPts val="0"/>
-                        </a:spcAft>
-                      </a:pPr>
-                      <a:r>
-                        <a:rPr lang="en-US" sz="1400" dirty="0">
-                          <a:effectLst/>
-                        </a:rPr>
-                        <a:t>Does not contribute to discussion or listen to others.</a:t>
-                      </a:r>
-                    </a:p>
-                    <a:p>
-                      <a:pPr marL="0" marR="0">
-                        <a:spcBef>
-                          <a:spcPts val="0"/>
-                        </a:spcBef>
-                        <a:spcAft>
-                          <a:spcPts val="0"/>
-                        </a:spcAft>
-                      </a:pPr>
-                      <a:r>
-                        <a:rPr lang="en-US" sz="1400" dirty="0">
-                          <a:effectLst/>
-                        </a:rPr>
-                        <a:t>Frequent absences.</a:t>
-                      </a:r>
-                    </a:p>
-                    <a:p>
-                      <a:pPr marL="0" marR="0">
-                        <a:spcBef>
-                          <a:spcPts val="0"/>
-                        </a:spcBef>
-                        <a:spcAft>
-                          <a:spcPts val="0"/>
-                        </a:spcAft>
-                      </a:pPr>
-                      <a:r>
-                        <a:rPr lang="en-US" sz="1400" dirty="0">
-                          <a:effectLst/>
-                        </a:rPr>
-                        <a:t> </a:t>
-                      </a:r>
-                      <a:endParaRPr lang="en-US" sz="1400" dirty="0">
-                        <a:effectLst/>
-                        <a:latin typeface="Calibri" panose="020F0502020204030204" pitchFamily="34" charset="0"/>
-                        <a:ea typeface="Calibri" panose="020F0502020204030204" pitchFamily="34" charset="0"/>
-                        <a:cs typeface="Times New Roman" panose="02020603050405020304" pitchFamily="18" charset="0"/>
-                      </a:endParaRPr>
-                    </a:p>
-                  </a:txBody>
-                  <a:tcPr marL="68580" marR="68580" marT="0" marB="0"/>
-                </a:tc>
-                <a:extLst>
-                  <a:ext uri="{0D108BD9-81ED-4DB2-BD59-A6C34878D82A}">
-                    <a16:rowId xmlns:a16="http://schemas.microsoft.com/office/drawing/2014/main" val="2844977910"/>
-                  </a:ext>
-                </a:extLst>
-              </a:tr>
-            </a:tbl>
-          </a:graphicData>
-        </a:graphic>
-      </p:graphicFrame>
+              <a:t>HEDCO 270</a:t>
+            </a:r>
+            <a:endParaRPr lang="en-US" sz="2400" b="1" dirty="0"/>
+          </a:p>
+          <a:p>
+            <a:pPr marL="0" indent="0">
+              <a:buNone/>
+            </a:pPr>
+            <a:endParaRPr lang="en-US" sz="2400" b="1" dirty="0"/>
+          </a:p>
+          <a:p>
+            <a:pPr marL="0" indent="0">
+              <a:buNone/>
+            </a:pPr>
+            <a:r>
+              <a:rPr lang="en-US" sz="2400" b="1" dirty="0"/>
+              <a:t>Or by appointment</a:t>
+            </a:r>
+          </a:p>
+          <a:p>
+            <a:pPr marL="0" indent="0">
+              <a:buNone/>
+            </a:pPr>
+            <a:r>
+              <a:rPr lang="en-US" dirty="0"/>
+              <a:t>	</a:t>
+            </a:r>
+            <a:r>
+              <a:rPr lang="en-US" sz="2400" dirty="0"/>
+              <a:t>Schedule with me by email or talking with me after class</a:t>
+            </a:r>
+          </a:p>
+        </p:txBody>
+      </p:sp>
     </p:spTree>
     <p:extLst>
       <p:ext uri="{BB962C8B-B14F-4D97-AF65-F5344CB8AC3E}">
-        <p14:creationId xmlns:p14="http://schemas.microsoft.com/office/powerpoint/2010/main" val="2327645326"/>
+        <p14:creationId xmlns:p14="http://schemas.microsoft.com/office/powerpoint/2010/main" val="2390692123"/>
       </p:ext>
     </p:extLst>
   </p:cSld>
@@ -6062,92 +5462,134 @@
         </p:nvSpPr>
         <p:spPr/>
         <p:txBody>
-          <a:bodyPr/>
+          <a:bodyPr>
+            <a:normAutofit/>
+          </a:bodyPr>
           <a:lstStyle/>
           <a:p>
             <a:r>
               <a:rPr lang="en-US" dirty="0"/>
-              <a:t>Office Hours</a:t>
-            </a:r>
-          </a:p>
-        </p:txBody>
-      </p:sp>
-      <p:sp>
-        <p:nvSpPr>
-          <p:cNvPr id="3" name="Content Placeholder 2"/>
-          <p:cNvSpPr>
-            <a:spLocks noGrp="1"/>
-          </p:cNvSpPr>
-          <p:nvPr>
-            <p:ph idx="1"/>
-          </p:nvPr>
+              <a:t>Observation Hours</a:t>
+            </a:r>
+          </a:p>
+        </p:txBody>
+      </p:sp>
+      <p:sp>
+        <p:nvSpPr>
+          <p:cNvPr id="3" name="TextBox 2">
+            <a:extLst>
+              <a:ext uri="{FF2B5EF4-FFF2-40B4-BE49-F238E27FC236}">
+                <a16:creationId xmlns:a16="http://schemas.microsoft.com/office/drawing/2014/main" id="{F8CE11F4-BBD4-AD49-9D9A-962912D1BA80}"/>
+              </a:ext>
+            </a:extLst>
+          </p:cNvPr>
+          <p:cNvSpPr txBox="1"/>
+          <p:nvPr/>
         </p:nvSpPr>
         <p:spPr>
           <a:xfrm>
-            <a:off x="1441174" y="1534738"/>
-            <a:ext cx="8736173" cy="4351338"/>
+            <a:off x="1891110" y="1599228"/>
+            <a:ext cx="8409780" cy="5262979"/>
           </a:xfrm>
+          <a:prstGeom prst="rect">
+            <a:avLst/>
+          </a:prstGeom>
+          <a:noFill/>
         </p:spPr>
         <p:txBody>
-          <a:bodyPr/>
-          <a:lstStyle/>
-          <a:p>
-            <a:pPr marL="0" indent="0">
-              <a:buNone/>
+          <a:bodyPr wrap="square" rtlCol="0">
+            <a:spAutoFit/>
+          </a:bodyPr>
+          <a:lstStyle/>
+          <a:p>
+            <a:r>
+              <a:rPr lang="en-US" sz="2400" dirty="0"/>
+              <a:t>Earn observation hours during class – at least 2.5 hours.</a:t>
+            </a:r>
+          </a:p>
+          <a:p>
+            <a:endParaRPr lang="en-US" sz="2400" dirty="0"/>
+          </a:p>
+          <a:p>
+            <a:r>
+              <a:rPr lang="en-US" sz="2400" dirty="0"/>
+              <a:t>Observation log will be provided at the end-of-the term.</a:t>
+            </a:r>
+          </a:p>
+          <a:p>
+            <a:endParaRPr lang="en-US" sz="2400" dirty="0"/>
+          </a:p>
+          <a:p>
+            <a:r>
+              <a:rPr lang="en-US" sz="2400" dirty="0"/>
+              <a:t>Other options if you need to complete the 25 hours of observations:</a:t>
+            </a:r>
+          </a:p>
+          <a:p>
+            <a:pPr marL="342900" indent="-342900">
+              <a:buFont typeface="Wingdings" pitchFamily="2" charset="2"/>
+              <a:buChar char="§"/>
             </a:pPr>
             <a:r>
-              <a:rPr lang="en-US" sz="2400" b="1" dirty="0"/>
-              <a:t>Tuesdays 10:00-11:30</a:t>
-            </a:r>
-          </a:p>
-          <a:p>
-            <a:pPr marL="0" indent="0">
-              <a:buNone/>
+              <a:rPr lang="en-US" sz="2400" dirty="0"/>
+              <a:t>Contact SLPs that you know</a:t>
+            </a:r>
+          </a:p>
+          <a:p>
+            <a:pPr marL="342900" indent="-342900">
+              <a:buFont typeface="Wingdings" pitchFamily="2" charset="2"/>
+              <a:buChar char="§"/>
             </a:pPr>
             <a:r>
-              <a:rPr lang="en-US" sz="2400" b="1" dirty="0"/>
-              <a:t>	</a:t>
-            </a:r>
-            <a:r>
               <a:rPr lang="en-US" sz="2400" dirty="0"/>
-              <a:t>HEDCO 270</a:t>
-            </a:r>
-            <a:endParaRPr lang="en-US" sz="2400" b="1" dirty="0"/>
-          </a:p>
-          <a:p>
-            <a:pPr marL="0" indent="0">
-              <a:buNone/>
+              <a:t>Sign up for limited </a:t>
+            </a:r>
+            <a:r>
+              <a:rPr lang="en-US" sz="2400" dirty="0" err="1"/>
+              <a:t>telepractice</a:t>
+            </a:r>
+            <a:r>
+              <a:rPr lang="en-US" sz="2400" dirty="0"/>
+              <a:t> observations that I will announce</a:t>
+            </a:r>
+          </a:p>
+          <a:p>
+            <a:pPr marL="342900" indent="-342900">
+              <a:buFont typeface="Wingdings" pitchFamily="2" charset="2"/>
+              <a:buChar char="§"/>
             </a:pPr>
-            <a:endParaRPr lang="en-US" sz="2400" b="1" dirty="0"/>
-          </a:p>
-          <a:p>
-            <a:pPr marL="0" indent="0">
-              <a:buNone/>
+            <a:r>
+              <a:rPr lang="en-US" sz="2400" dirty="0"/>
+              <a:t>Enroll in Master Clinician Network for online simulated observations which I can approve through August 1, 2022.</a:t>
+            </a:r>
+          </a:p>
+          <a:p>
+            <a:pPr marL="800100" lvl="1" indent="-342900">
+              <a:buFont typeface="Wingdings" pitchFamily="2" charset="2"/>
+              <a:buChar char="§"/>
             </a:pPr>
             <a:r>
-              <a:rPr lang="en-US" sz="2400" b="1" dirty="0"/>
-              <a:t>Or by appointment</a:t>
-            </a:r>
-          </a:p>
-          <a:p>
-            <a:pPr marL="0" indent="0">
-              <a:buNone/>
-            </a:pPr>
-            <a:r>
-              <a:rPr lang="en-US" dirty="0"/>
-              <a:t>	</a:t>
+              <a:rPr lang="en-US" sz="2400" dirty="0" err="1"/>
+              <a:t>www.masterclinician.org</a:t>
             </a:r>
             <a:r>
               <a:rPr lang="en-US" sz="2400" dirty="0"/>
-              <a:t>Schedule with me by email or talking with me after class</a:t>
-            </a:r>
+              <a:t>   </a:t>
+            </a:r>
+          </a:p>
+          <a:p>
+            <a:pPr lvl="1"/>
+            <a:endParaRPr lang="en-US" sz="2400" dirty="0"/>
+          </a:p>
+          <a:p>
+            <a:endParaRPr lang="en-US" sz="2400" dirty="0"/>
           </a:p>
         </p:txBody>
       </p:sp>
     </p:spTree>
     <p:extLst>
       <p:ext uri="{BB962C8B-B14F-4D97-AF65-F5344CB8AC3E}">
-        <p14:creationId xmlns:p14="http://schemas.microsoft.com/office/powerpoint/2010/main" val="2390692123"/>
+        <p14:creationId xmlns:p14="http://schemas.microsoft.com/office/powerpoint/2010/main" val="1090128238"/>
       </p:ext>
     </p:extLst>
   </p:cSld>
@@ -6176,12 +5618,47 @@
       </p:grpSpPr>
       <p:sp>
         <p:nvSpPr>
-          <p:cNvPr id="2" name="Title 1"/>
+          <p:cNvPr id="2" name="Title 1">
+            <a:extLst>
+              <a:ext uri="{FF2B5EF4-FFF2-40B4-BE49-F238E27FC236}">
+                <a16:creationId xmlns:a16="http://schemas.microsoft.com/office/drawing/2014/main" id="{4FA73B90-0516-3E4E-B3EC-C77497EAF707}"/>
+              </a:ext>
+            </a:extLst>
+          </p:cNvPr>
           <p:cNvSpPr>
             <a:spLocks noGrp="1"/>
           </p:cNvSpPr>
           <p:nvPr>
             <p:ph type="title"/>
+          </p:nvPr>
+        </p:nvSpPr>
+        <p:spPr/>
+        <p:txBody>
+          <a:bodyPr/>
+          <a:lstStyle/>
+          <a:p>
+            <a:pPr algn="ctr"/>
+            <a:r>
+              <a:rPr lang="en-US" b="1" dirty="0"/>
+              <a:t>The Objective of Speech-Language Pathology Services</a:t>
+            </a:r>
+          </a:p>
+        </p:txBody>
+      </p:sp>
+      <p:sp>
+        <p:nvSpPr>
+          <p:cNvPr id="3" name="Content Placeholder 2">
+            <a:extLst>
+              <a:ext uri="{FF2B5EF4-FFF2-40B4-BE49-F238E27FC236}">
+                <a16:creationId xmlns:a16="http://schemas.microsoft.com/office/drawing/2014/main" id="{E6099405-DDD8-4E41-BDA2-0DF85EFD0BDD}"/>
+              </a:ext>
+            </a:extLst>
+          </p:cNvPr>
+          <p:cNvSpPr>
+            <a:spLocks noGrp="1"/>
+          </p:cNvSpPr>
+          <p:nvPr>
+            <p:ph idx="1"/>
           </p:nvPr>
         </p:nvSpPr>
         <p:spPr/>
@@ -6191,129 +5668,29 @@
           </a:bodyPr>
           <a:lstStyle/>
           <a:p>
-            <a:r>
-              <a:rPr lang="en-US" dirty="0"/>
-              <a:t>Observation Hours</a:t>
-            </a:r>
-          </a:p>
-        </p:txBody>
-      </p:sp>
-      <p:sp>
-        <p:nvSpPr>
-          <p:cNvPr id="3" name="TextBox 2">
-            <a:extLst>
-              <a:ext uri="{FF2B5EF4-FFF2-40B4-BE49-F238E27FC236}">
-                <a16:creationId xmlns:a16="http://schemas.microsoft.com/office/drawing/2014/main" id="{F8CE11F4-BBD4-AD49-9D9A-962912D1BA80}"/>
-              </a:ext>
-            </a:extLst>
-          </p:cNvPr>
-          <p:cNvSpPr txBox="1"/>
-          <p:nvPr/>
-        </p:nvSpPr>
-        <p:spPr>
-          <a:xfrm>
-            <a:off x="1891110" y="1599228"/>
-            <a:ext cx="8409780" cy="5262979"/>
-          </a:xfrm>
-          <a:prstGeom prst="rect">
-            <a:avLst/>
-          </a:prstGeom>
-          <a:noFill/>
-        </p:spPr>
-        <p:txBody>
-          <a:bodyPr wrap="square" rtlCol="0">
-            <a:spAutoFit/>
-          </a:bodyPr>
-          <a:lstStyle/>
-          <a:p>
-            <a:r>
-              <a:rPr lang="en-US" sz="2400" dirty="0"/>
-              <a:t>Earn observation hours during class – at least 2.5 hours.</a:t>
-            </a:r>
-          </a:p>
-          <a:p>
-            <a:endParaRPr lang="en-US" sz="2400" dirty="0"/>
-          </a:p>
-          <a:p>
-            <a:r>
-              <a:rPr lang="en-US" sz="2400" dirty="0"/>
-              <a:t>Observation log will be provided at the end-of-the term.</a:t>
-            </a:r>
-          </a:p>
-          <a:p>
-            <a:endParaRPr lang="en-US" sz="2400" dirty="0"/>
-          </a:p>
-          <a:p>
-            <a:r>
-              <a:rPr lang="en-US" sz="2400" dirty="0"/>
-              <a:t>Other options if you need to complete the 25 hours of observations:</a:t>
-            </a:r>
-          </a:p>
-          <a:p>
-            <a:pPr marL="342900" indent="-342900">
-              <a:buFont typeface="Wingdings" pitchFamily="2" charset="2"/>
-              <a:buChar char="§"/>
+            <a:pPr marL="0" indent="0">
+              <a:buNone/>
             </a:pPr>
             <a:r>
-              <a:rPr lang="en-US" sz="2400" dirty="0"/>
-              <a:t>Contact SLPs that you know</a:t>
-            </a:r>
-          </a:p>
-          <a:p>
-            <a:pPr marL="342900" indent="-342900">
-              <a:buFont typeface="Wingdings" pitchFamily="2" charset="2"/>
-              <a:buChar char="§"/>
+              <a:rPr lang="en-US" sz="3200" dirty="0"/>
+              <a:t>“The overall objective of speech-language pathology services is to optimize individuals’ ability to communicate and/or swallow in natural environments and, thus, improve their quality of life.  This objective is best achieved by the provision of integrated services in meaningful life contexts.”	</a:t>
+            </a:r>
+          </a:p>
+          <a:p>
+            <a:pPr marL="0" indent="0" algn="r">
+              <a:buNone/>
             </a:pPr>
             <a:r>
-              <a:rPr lang="en-US" sz="2400" dirty="0"/>
-              <a:t>Sign up for limited </a:t>
-            </a:r>
-            <a:r>
-              <a:rPr lang="en-US" sz="2400" dirty="0" err="1"/>
-              <a:t>telepractice</a:t>
-            </a:r>
-            <a:r>
-              <a:rPr lang="en-US" sz="2400" dirty="0"/>
-              <a:t> observations that I will announce</a:t>
-            </a:r>
-          </a:p>
-          <a:p>
-            <a:pPr marL="342900" indent="-342900">
-              <a:buFont typeface="Wingdings" pitchFamily="2" charset="2"/>
-              <a:buChar char="§"/>
-            </a:pPr>
-            <a:r>
-              <a:rPr lang="en-US" sz="2400" dirty="0"/>
-              <a:t>Enroll in Master Clinician Network for online simulated observations which I can approve through August 1, 2022.</a:t>
-            </a:r>
-          </a:p>
-          <a:p>
-            <a:pPr marL="800100" lvl="1" indent="-342900">
-              <a:buFont typeface="Wingdings" pitchFamily="2" charset="2"/>
-              <a:buChar char="§"/>
-            </a:pPr>
-            <a:r>
-              <a:rPr lang="en-US" sz="2400" dirty="0" err="1"/>
-              <a:t>www.masterclinician.org</a:t>
-            </a:r>
-            <a:r>
-              <a:rPr lang="en-US" sz="2400" dirty="0"/>
-              <a:t>   </a:t>
-            </a:r>
-          </a:p>
-          <a:p>
-            <a:pPr lvl="1"/>
-            <a:endParaRPr lang="en-US" sz="2400" dirty="0"/>
-          </a:p>
-          <a:p>
-            <a:endParaRPr lang="en-US" sz="2400" dirty="0"/>
+              <a:rPr lang="en-US" sz="3200" dirty="0"/>
+              <a:t>ASHA 2001</a:t>
+            </a:r>
           </a:p>
         </p:txBody>
       </p:sp>
     </p:spTree>
     <p:extLst>
       <p:ext uri="{BB962C8B-B14F-4D97-AF65-F5344CB8AC3E}">
-        <p14:creationId xmlns:p14="http://schemas.microsoft.com/office/powerpoint/2010/main" val="1090128238"/>
+        <p14:creationId xmlns:p14="http://schemas.microsoft.com/office/powerpoint/2010/main" val="3022097658"/>
       </p:ext>
     </p:extLst>
   </p:cSld>
@@ -6342,221 +5719,6 @@
       </p:grpSpPr>
       <p:sp>
         <p:nvSpPr>
-          <p:cNvPr id="2" name="Title 1"/>
-          <p:cNvSpPr>
-            <a:spLocks noGrp="1"/>
-          </p:cNvSpPr>
-          <p:nvPr>
-            <p:ph type="title"/>
-          </p:nvPr>
-        </p:nvSpPr>
-        <p:spPr/>
-        <p:txBody>
-          <a:bodyPr>
-            <a:normAutofit/>
-          </a:bodyPr>
-          <a:lstStyle/>
-          <a:p>
-            <a:r>
-              <a:rPr lang="en-US" dirty="0"/>
-              <a:t>Case Studies in the Learning Commons </a:t>
-            </a:r>
-          </a:p>
-        </p:txBody>
-      </p:sp>
-      <p:sp>
-        <p:nvSpPr>
-          <p:cNvPr id="3" name="Content Placeholder 2"/>
-          <p:cNvSpPr>
-            <a:spLocks noGrp="1"/>
-          </p:cNvSpPr>
-          <p:nvPr>
-            <p:ph idx="1"/>
-          </p:nvPr>
-        </p:nvSpPr>
-        <p:spPr>
-          <a:xfrm>
-            <a:off x="2152650" y="1801906"/>
-            <a:ext cx="8077200" cy="4922744"/>
-          </a:xfrm>
-        </p:spPr>
-        <p:txBody>
-          <a:bodyPr>
-            <a:normAutofit/>
-          </a:bodyPr>
-          <a:lstStyle/>
-          <a:p>
-            <a:r>
-              <a:rPr lang="en-US" sz="2400" dirty="0"/>
-              <a:t>What is so special about these cases?</a:t>
-            </a:r>
-          </a:p>
-          <a:p>
-            <a:r>
-              <a:rPr lang="en-US" sz="2400" dirty="0"/>
-              <a:t>Instructions on CDS undergrad Canvas site</a:t>
-            </a:r>
-          </a:p>
-          <a:p>
-            <a:r>
-              <a:rPr lang="en-US" sz="2400" dirty="0"/>
-              <a:t>Go to LC and watch video- please also access reports and other documents</a:t>
-            </a:r>
-          </a:p>
-          <a:p>
-            <a:r>
-              <a:rPr lang="en-US" sz="2400" dirty="0"/>
-              <a:t>Fill out summary notes and an observation log (blank one on Canvas)</a:t>
-            </a:r>
-          </a:p>
-          <a:p>
-            <a:pPr lvl="1">
-              <a:buFont typeface="Wingdings" pitchFamily="2" charset="2"/>
-              <a:buChar char="§"/>
-            </a:pPr>
-            <a:r>
-              <a:rPr lang="en-US" sz="2100" dirty="0"/>
-              <a:t>You can submit to me and I’ll verify and sign</a:t>
-            </a:r>
-          </a:p>
-          <a:p>
-            <a:endParaRPr lang="en-US" dirty="0"/>
-          </a:p>
-        </p:txBody>
-      </p:sp>
-    </p:spTree>
-    <p:extLst>
-      <p:ext uri="{BB962C8B-B14F-4D97-AF65-F5344CB8AC3E}">
-        <p14:creationId xmlns:p14="http://schemas.microsoft.com/office/powerpoint/2010/main" val="1769905236"/>
-      </p:ext>
-    </p:extLst>
-  </p:cSld>
-  <p:clrMapOvr>
-    <a:masterClrMapping/>
-  </p:clrMapOvr>
-</p:sld>
-</file>
-
-<file path=ppt/slides/slide17.xml><?xml version="1.0" encoding="utf-8"?>
-<p:sld xmlns:a="http://schemas.openxmlformats.org/drawingml/2006/main" xmlns:r="http://schemas.openxmlformats.org/officeDocument/2006/relationships" xmlns:p="http://schemas.openxmlformats.org/presentationml/2006/main">
-  <p:cSld>
-    <p:spTree>
-      <p:nvGrpSpPr>
-        <p:cNvPr id="1" name=""/>
-        <p:cNvGrpSpPr/>
-        <p:nvPr/>
-      </p:nvGrpSpPr>
-      <p:grpSpPr>
-        <a:xfrm>
-          <a:off x="0" y="0"/>
-          <a:ext cx="0" cy="0"/>
-          <a:chOff x="0" y="0"/>
-          <a:chExt cx="0" cy="0"/>
-        </a:xfrm>
-      </p:grpSpPr>
-      <p:sp>
-        <p:nvSpPr>
-          <p:cNvPr id="2" name="Title 1">
-            <a:extLst>
-              <a:ext uri="{FF2B5EF4-FFF2-40B4-BE49-F238E27FC236}">
-                <a16:creationId xmlns:a16="http://schemas.microsoft.com/office/drawing/2014/main" id="{4FA73B90-0516-3E4E-B3EC-C77497EAF707}"/>
-              </a:ext>
-            </a:extLst>
-          </p:cNvPr>
-          <p:cNvSpPr>
-            <a:spLocks noGrp="1"/>
-          </p:cNvSpPr>
-          <p:nvPr>
-            <p:ph type="title"/>
-          </p:nvPr>
-        </p:nvSpPr>
-        <p:spPr/>
-        <p:txBody>
-          <a:bodyPr/>
-          <a:lstStyle/>
-          <a:p>
-            <a:pPr algn="ctr"/>
-            <a:r>
-              <a:rPr lang="en-US" b="1" dirty="0"/>
-              <a:t>The Objective of Speech-Language Pathology Services</a:t>
-            </a:r>
-          </a:p>
-        </p:txBody>
-      </p:sp>
-      <p:sp>
-        <p:nvSpPr>
-          <p:cNvPr id="3" name="Content Placeholder 2">
-            <a:extLst>
-              <a:ext uri="{FF2B5EF4-FFF2-40B4-BE49-F238E27FC236}">
-                <a16:creationId xmlns:a16="http://schemas.microsoft.com/office/drawing/2014/main" id="{E6099405-DDD8-4E41-BDA2-0DF85EFD0BDD}"/>
-              </a:ext>
-            </a:extLst>
-          </p:cNvPr>
-          <p:cNvSpPr>
-            <a:spLocks noGrp="1"/>
-          </p:cNvSpPr>
-          <p:nvPr>
-            <p:ph idx="1"/>
-          </p:nvPr>
-        </p:nvSpPr>
-        <p:spPr/>
-        <p:txBody>
-          <a:bodyPr>
-            <a:normAutofit/>
-          </a:bodyPr>
-          <a:lstStyle/>
-          <a:p>
-            <a:pPr marL="0" indent="0">
-              <a:buNone/>
-            </a:pPr>
-            <a:r>
-              <a:rPr lang="en-US" sz="3200" dirty="0"/>
-              <a:t>“The overall objective of speech-language pathology services is to optimize individuals’ ability to communicate and/or swallow in natural environments and, thus, improve their quality of life.  This objective is best achieved by the provision of integrated services in meaningful life contexts.”	</a:t>
-            </a:r>
-          </a:p>
-          <a:p>
-            <a:pPr marL="0" indent="0" algn="r">
-              <a:buNone/>
-            </a:pPr>
-            <a:r>
-              <a:rPr lang="en-US" sz="3200" dirty="0"/>
-              <a:t>ASHA 2001</a:t>
-            </a:r>
-          </a:p>
-        </p:txBody>
-      </p:sp>
-    </p:spTree>
-    <p:extLst>
-      <p:ext uri="{BB962C8B-B14F-4D97-AF65-F5344CB8AC3E}">
-        <p14:creationId xmlns:p14="http://schemas.microsoft.com/office/powerpoint/2010/main" val="3022097658"/>
-      </p:ext>
-    </p:extLst>
-  </p:cSld>
-  <p:clrMapOvr>
-    <a:masterClrMapping/>
-  </p:clrMapOvr>
-</p:sld>
-</file>
-
-<file path=ppt/slides/slide18.xml><?xml version="1.0" encoding="utf-8"?>
-<p:sld xmlns:a="http://schemas.openxmlformats.org/drawingml/2006/main" xmlns:r="http://schemas.openxmlformats.org/officeDocument/2006/relationships" xmlns:p="http://schemas.openxmlformats.org/presentationml/2006/main">
-  <p:cSld>
-    <p:spTree>
-      <p:nvGrpSpPr>
-        <p:cNvPr id="1" name=""/>
-        <p:cNvGrpSpPr/>
-        <p:nvPr/>
-      </p:nvGrpSpPr>
-      <p:grpSpPr>
-        <a:xfrm>
-          <a:off x="0" y="0"/>
-          <a:ext cx="0" cy="0"/>
-          <a:chOff x="0" y="0"/>
-          <a:chExt cx="0" cy="0"/>
-        </a:xfrm>
-      </p:grpSpPr>
-      <p:sp>
-        <p:nvSpPr>
           <p:cNvPr id="2" name="Title 1">
             <a:extLst>
               <a:ext uri="{FF2B5EF4-FFF2-40B4-BE49-F238E27FC236}">
@@ -6677,7 +5839,7 @@
 </p:sld>
 </file>
 
-<file path=ppt/slides/slide19.xml><?xml version="1.0" encoding="utf-8"?>
+<file path=ppt/slides/slide17.xml><?xml version="1.0" encoding="utf-8"?>
 <p:sld xmlns:a="http://schemas.openxmlformats.org/drawingml/2006/main" xmlns:r="http://schemas.openxmlformats.org/officeDocument/2006/relationships" xmlns:p="http://schemas.openxmlformats.org/presentationml/2006/main">
   <p:cSld>
     <p:spTree>
@@ -7118,7 +6280,7 @@
 </p:sld>
 </file>
 
-<file path=ppt/slides/slide2.xml><?xml version="1.0" encoding="utf-8"?>
+<file path=ppt/slides/slide18.xml><?xml version="1.0" encoding="utf-8"?>
 <p:sld xmlns:a="http://schemas.openxmlformats.org/drawingml/2006/main" xmlns:r="http://schemas.openxmlformats.org/officeDocument/2006/relationships" xmlns:p="http://schemas.openxmlformats.org/presentationml/2006/main">
   <p:cSld>
     <p:spTree>
@@ -7137,95 +6299,6 @@
       </p:grpSpPr>
       <p:sp>
         <p:nvSpPr>
-          <p:cNvPr id="2" name="Title 1"/>
-          <p:cNvSpPr>
-            <a:spLocks noGrp="1"/>
-          </p:cNvSpPr>
-          <p:nvPr>
-            <p:ph type="title"/>
-          </p:nvPr>
-        </p:nvSpPr>
-        <p:spPr/>
-        <p:txBody>
-          <a:bodyPr>
-            <a:normAutofit/>
-          </a:bodyPr>
-          <a:lstStyle/>
-          <a:p>
-            <a:r>
-              <a:rPr lang="en-US" b="1" dirty="0"/>
-              <a:t>Getting to Know You!</a:t>
-            </a:r>
-          </a:p>
-        </p:txBody>
-      </p:sp>
-      <p:sp>
-        <p:nvSpPr>
-          <p:cNvPr id="7" name="Content Placeholder 6">
-            <a:extLst>
-              <a:ext uri="{FF2B5EF4-FFF2-40B4-BE49-F238E27FC236}">
-                <a16:creationId xmlns:a16="http://schemas.microsoft.com/office/drawing/2014/main" id="{1139561A-DC07-094E-B28F-F0122844604D}"/>
-              </a:ext>
-            </a:extLst>
-          </p:cNvPr>
-          <p:cNvSpPr>
-            <a:spLocks noGrp="1"/>
-          </p:cNvSpPr>
-          <p:nvPr>
-            <p:ph idx="1"/>
-          </p:nvPr>
-        </p:nvSpPr>
-        <p:spPr>
-          <a:xfrm>
-            <a:off x="2152650" y="1825625"/>
-            <a:ext cx="7886700" cy="4951095"/>
-          </a:xfrm>
-        </p:spPr>
-        <p:txBody>
-          <a:bodyPr>
-            <a:normAutofit/>
-          </a:bodyPr>
-          <a:lstStyle/>
-          <a:p>
-            <a:r>
-              <a:rPr lang="en-US" sz="4000" dirty="0"/>
-              <a:t>Complete course “get to know you” questionnaire and pre-survey by 3/31 at 5:00 PM</a:t>
-            </a:r>
-          </a:p>
-        </p:txBody>
-      </p:sp>
-    </p:spTree>
-    <p:extLst>
-      <p:ext uri="{BB962C8B-B14F-4D97-AF65-F5344CB8AC3E}">
-        <p14:creationId xmlns:p14="http://schemas.microsoft.com/office/powerpoint/2010/main" val="887369877"/>
-      </p:ext>
-    </p:extLst>
-  </p:cSld>
-  <p:clrMapOvr>
-    <a:masterClrMapping/>
-  </p:clrMapOvr>
-</p:sld>
-</file>
-
-<file path=ppt/slides/slide20.xml><?xml version="1.0" encoding="utf-8"?>
-<p:sld xmlns:a="http://schemas.openxmlformats.org/drawingml/2006/main" xmlns:r="http://schemas.openxmlformats.org/officeDocument/2006/relationships" xmlns:p="http://schemas.openxmlformats.org/presentationml/2006/main">
-  <p:cSld>
-    <p:spTree>
-      <p:nvGrpSpPr>
-        <p:cNvPr id="1" name=""/>
-        <p:cNvGrpSpPr/>
-        <p:nvPr/>
-      </p:nvGrpSpPr>
-      <p:grpSpPr>
-        <a:xfrm>
-          <a:off x="0" y="0"/>
-          <a:ext cx="0" cy="0"/>
-          <a:chOff x="0" y="0"/>
-          <a:chExt cx="0" cy="0"/>
-        </a:xfrm>
-      </p:grpSpPr>
-      <p:sp>
-        <p:nvSpPr>
           <p:cNvPr id="2" name="Title 1">
             <a:extLst>
               <a:ext uri="{FF2B5EF4-FFF2-40B4-BE49-F238E27FC236}">
@@ -7356,7 +6429,7 @@
 </p:sld>
 </file>
 
-<file path=ppt/slides/slide21.xml><?xml version="1.0" encoding="utf-8"?>
+<file path=ppt/slides/slide19.xml><?xml version="1.0" encoding="utf-8"?>
 <p:sld xmlns:a="http://schemas.openxmlformats.org/drawingml/2006/main" xmlns:r="http://schemas.openxmlformats.org/officeDocument/2006/relationships" xmlns:p="http://schemas.openxmlformats.org/presentationml/2006/main">
   <p:cSld>
     <p:spTree>
@@ -7866,7 +6939,7 @@
 </p:sld>
 </file>
 
-<file path=ppt/slides/slide22.xml><?xml version="1.0" encoding="utf-8"?>
+<file path=ppt/slides/slide2.xml><?xml version="1.0" encoding="utf-8"?>
 <p:sld xmlns:a="http://schemas.openxmlformats.org/drawingml/2006/main" xmlns:r="http://schemas.openxmlformats.org/officeDocument/2006/relationships" xmlns:p="http://schemas.openxmlformats.org/presentationml/2006/main">
   <p:cSld>
     <p:spTree>
@@ -7885,10 +6958,34 @@
       </p:grpSpPr>
       <p:sp>
         <p:nvSpPr>
-          <p:cNvPr id="2" name="Title 1">
+          <p:cNvPr id="2" name="Title 1"/>
+          <p:cNvSpPr>
+            <a:spLocks noGrp="1"/>
+          </p:cNvSpPr>
+          <p:nvPr>
+            <p:ph type="title"/>
+          </p:nvPr>
+        </p:nvSpPr>
+        <p:spPr/>
+        <p:txBody>
+          <a:bodyPr>
+            <a:normAutofit/>
+          </a:bodyPr>
+          <a:lstStyle/>
+          <a:p>
+            <a:r>
+              <a:rPr lang="en-US" b="1" dirty="0"/>
+              <a:t>Getting to Know You!</a:t>
+            </a:r>
+          </a:p>
+        </p:txBody>
+      </p:sp>
+      <p:sp>
+        <p:nvSpPr>
+          <p:cNvPr id="7" name="Content Placeholder 6">
             <a:extLst>
               <a:ext uri="{FF2B5EF4-FFF2-40B4-BE49-F238E27FC236}">
-                <a16:creationId xmlns:a16="http://schemas.microsoft.com/office/drawing/2014/main" id="{E3D60B33-C63D-7F47-9CE2-7E7543342E97}"/>
+                <a16:creationId xmlns:a16="http://schemas.microsoft.com/office/drawing/2014/main" id="{1139561A-DC07-094E-B28F-F0122844604D}"/>
               </a:ext>
             </a:extLst>
           </p:cNvPr>
@@ -7896,88 +6993,24 @@
             <a:spLocks noGrp="1"/>
           </p:cNvSpPr>
           <p:nvPr>
-            <p:ph type="title"/>
+            <p:ph idx="1"/>
           </p:nvPr>
         </p:nvSpPr>
         <p:spPr>
           <a:xfrm>
-            <a:off x="2056436" y="318828"/>
-            <a:ext cx="8611565" cy="1325563"/>
+            <a:off x="2152650" y="1825625"/>
+            <a:ext cx="7886700" cy="4951095"/>
           </a:xfrm>
         </p:spPr>
         <p:txBody>
-          <a:bodyPr/>
-          <a:lstStyle/>
-          <a:p>
-            <a:r>
-              <a:rPr lang="en-US" b="1" u="sng" dirty="0"/>
-              <a:t>Two Broad Components of Therapeutic Skills</a:t>
-            </a:r>
-          </a:p>
-        </p:txBody>
-      </p:sp>
-      <p:sp>
-        <p:nvSpPr>
-          <p:cNvPr id="3" name="TextBox 2">
-            <a:extLst>
-              <a:ext uri="{FF2B5EF4-FFF2-40B4-BE49-F238E27FC236}">
-                <a16:creationId xmlns:a16="http://schemas.microsoft.com/office/drawing/2014/main" id="{8FBCB753-A325-F148-A0D1-C22B21AA9E1B}"/>
-              </a:ext>
-            </a:extLst>
-          </p:cNvPr>
-          <p:cNvSpPr txBox="1"/>
-          <p:nvPr/>
-        </p:nvSpPr>
-        <p:spPr>
-          <a:xfrm>
-            <a:off x="2779853" y="2257848"/>
-            <a:ext cx="6632294" cy="2862322"/>
-          </a:xfrm>
-          <a:prstGeom prst="rect">
-            <a:avLst/>
-          </a:prstGeom>
-          <a:noFill/>
-        </p:spPr>
-        <p:txBody>
-          <a:bodyPr wrap="square" rtlCol="0">
-            <a:spAutoFit/>
+          <a:bodyPr>
+            <a:normAutofit/>
           </a:bodyPr>
           <a:lstStyle/>
           <a:p>
-            <a:pPr marL="571500" indent="-571500">
-              <a:buFont typeface="Wingdings" pitchFamily="2" charset="2"/>
-              <a:buChar char="v"/>
-            </a:pPr>
-            <a:r>
-              <a:rPr lang="en-US" sz="3600" b="1" dirty="0"/>
-              <a:t>Interpersonal Communication</a:t>
-            </a:r>
-          </a:p>
-          <a:p>
-            <a:endParaRPr lang="en-US" sz="3600" b="1" dirty="0"/>
-          </a:p>
-          <a:p>
-            <a:pPr marL="571500" indent="-571500">
-              <a:buFont typeface="Wingdings" pitchFamily="2" charset="2"/>
-              <a:buChar char="v"/>
-            </a:pPr>
-            <a:endParaRPr lang="en-US" sz="3600" b="1" dirty="0"/>
-          </a:p>
-          <a:p>
-            <a:pPr marL="571500" indent="-571500">
-              <a:buFont typeface="Wingdings" pitchFamily="2" charset="2"/>
-              <a:buChar char="v"/>
-            </a:pPr>
-            <a:endParaRPr lang="en-US" sz="3600" b="1" dirty="0"/>
-          </a:p>
-          <a:p>
-            <a:pPr marL="571500" indent="-571500">
-              <a:buFont typeface="Wingdings" pitchFamily="2" charset="2"/>
-              <a:buChar char="v"/>
-            </a:pPr>
-            <a:r>
-              <a:rPr lang="en-US" sz="3600" b="1" dirty="0"/>
-              <a:t>Therapeutic-Specific Skills</a:t>
+            <a:r>
+              <a:rPr lang="en-US" sz="4000" dirty="0"/>
+              <a:t>Complete course “get to know you” questionnaire and pre-survey by 3/31 at 5:00 PM</a:t>
             </a:r>
           </a:p>
         </p:txBody>
@@ -7985,7 +7018,7 @@
     </p:spTree>
     <p:extLst>
       <p:ext uri="{BB962C8B-B14F-4D97-AF65-F5344CB8AC3E}">
-        <p14:creationId xmlns:p14="http://schemas.microsoft.com/office/powerpoint/2010/main" val="209436093"/>
+        <p14:creationId xmlns:p14="http://schemas.microsoft.com/office/powerpoint/2010/main" val="887369877"/>
       </p:ext>
     </p:extLst>
   </p:cSld>
@@ -7995,7 +7028,7 @@
 </p:sld>
 </file>
 
-<file path=ppt/slides/slide23.xml><?xml version="1.0" encoding="utf-8"?>
+<file path=ppt/slides/slide20.xml><?xml version="1.0" encoding="utf-8"?>
 <p:sld xmlns:a="http://schemas.openxmlformats.org/drawingml/2006/main" xmlns:r="http://schemas.openxmlformats.org/officeDocument/2006/relationships" xmlns:p="http://schemas.openxmlformats.org/presentationml/2006/main">
   <p:cSld>
     <p:spTree>
@@ -8017,6 +7050,135 @@
           <p:cNvPr id="2" name="Title 1">
             <a:extLst>
               <a:ext uri="{FF2B5EF4-FFF2-40B4-BE49-F238E27FC236}">
+                <a16:creationId xmlns:a16="http://schemas.microsoft.com/office/drawing/2014/main" id="{E3D60B33-C63D-7F47-9CE2-7E7543342E97}"/>
+              </a:ext>
+            </a:extLst>
+          </p:cNvPr>
+          <p:cNvSpPr>
+            <a:spLocks noGrp="1"/>
+          </p:cNvSpPr>
+          <p:nvPr>
+            <p:ph type="title"/>
+          </p:nvPr>
+        </p:nvSpPr>
+        <p:spPr>
+          <a:xfrm>
+            <a:off x="2056436" y="318828"/>
+            <a:ext cx="8611565" cy="1325563"/>
+          </a:xfrm>
+        </p:spPr>
+        <p:txBody>
+          <a:bodyPr/>
+          <a:lstStyle/>
+          <a:p>
+            <a:r>
+              <a:rPr lang="en-US" b="1" u="sng" dirty="0"/>
+              <a:t>Two Broad Components of Therapeutic Skills</a:t>
+            </a:r>
+          </a:p>
+        </p:txBody>
+      </p:sp>
+      <p:sp>
+        <p:nvSpPr>
+          <p:cNvPr id="3" name="TextBox 2">
+            <a:extLst>
+              <a:ext uri="{FF2B5EF4-FFF2-40B4-BE49-F238E27FC236}">
+                <a16:creationId xmlns:a16="http://schemas.microsoft.com/office/drawing/2014/main" id="{8FBCB753-A325-F148-A0D1-C22B21AA9E1B}"/>
+              </a:ext>
+            </a:extLst>
+          </p:cNvPr>
+          <p:cNvSpPr txBox="1"/>
+          <p:nvPr/>
+        </p:nvSpPr>
+        <p:spPr>
+          <a:xfrm>
+            <a:off x="2779853" y="2257848"/>
+            <a:ext cx="6632294" cy="2862322"/>
+          </a:xfrm>
+          <a:prstGeom prst="rect">
+            <a:avLst/>
+          </a:prstGeom>
+          <a:noFill/>
+        </p:spPr>
+        <p:txBody>
+          <a:bodyPr wrap="square" rtlCol="0">
+            <a:spAutoFit/>
+          </a:bodyPr>
+          <a:lstStyle/>
+          <a:p>
+            <a:pPr marL="571500" indent="-571500">
+              <a:buFont typeface="Wingdings" pitchFamily="2" charset="2"/>
+              <a:buChar char="v"/>
+            </a:pPr>
+            <a:r>
+              <a:rPr lang="en-US" sz="3600" b="1" dirty="0"/>
+              <a:t>Interpersonal Communication</a:t>
+            </a:r>
+          </a:p>
+          <a:p>
+            <a:endParaRPr lang="en-US" sz="3600" b="1" dirty="0"/>
+          </a:p>
+          <a:p>
+            <a:pPr marL="571500" indent="-571500">
+              <a:buFont typeface="Wingdings" pitchFamily="2" charset="2"/>
+              <a:buChar char="v"/>
+            </a:pPr>
+            <a:endParaRPr lang="en-US" sz="3600" b="1" dirty="0"/>
+          </a:p>
+          <a:p>
+            <a:pPr marL="571500" indent="-571500">
+              <a:buFont typeface="Wingdings" pitchFamily="2" charset="2"/>
+              <a:buChar char="v"/>
+            </a:pPr>
+            <a:endParaRPr lang="en-US" sz="3600" b="1" dirty="0"/>
+          </a:p>
+          <a:p>
+            <a:pPr marL="571500" indent="-571500">
+              <a:buFont typeface="Wingdings" pitchFamily="2" charset="2"/>
+              <a:buChar char="v"/>
+            </a:pPr>
+            <a:r>
+              <a:rPr lang="en-US" sz="3600" b="1" dirty="0"/>
+              <a:t>Therapeutic-Specific Skills</a:t>
+            </a:r>
+          </a:p>
+        </p:txBody>
+      </p:sp>
+    </p:spTree>
+    <p:extLst>
+      <p:ext uri="{BB962C8B-B14F-4D97-AF65-F5344CB8AC3E}">
+        <p14:creationId xmlns:p14="http://schemas.microsoft.com/office/powerpoint/2010/main" val="209436093"/>
+      </p:ext>
+    </p:extLst>
+  </p:cSld>
+  <p:clrMapOvr>
+    <a:masterClrMapping/>
+  </p:clrMapOvr>
+</p:sld>
+</file>
+
+<file path=ppt/slides/slide21.xml><?xml version="1.0" encoding="utf-8"?>
+<p:sld xmlns:a="http://schemas.openxmlformats.org/drawingml/2006/main" xmlns:r="http://schemas.openxmlformats.org/officeDocument/2006/relationships" xmlns:p="http://schemas.openxmlformats.org/presentationml/2006/main">
+  <p:cSld>
+    <p:spTree>
+      <p:nvGrpSpPr>
+        <p:cNvPr id="1" name=""/>
+        <p:cNvGrpSpPr/>
+        <p:nvPr/>
+      </p:nvGrpSpPr>
+      <p:grpSpPr>
+        <a:xfrm>
+          <a:off x="0" y="0"/>
+          <a:ext cx="0" cy="0"/>
+          <a:chOff x="0" y="0"/>
+          <a:chExt cx="0" cy="0"/>
+        </a:xfrm>
+      </p:grpSpPr>
+      <p:sp>
+        <p:nvSpPr>
+          <p:cNvPr id="2" name="Title 1">
+            <a:extLst>
+              <a:ext uri="{FF2B5EF4-FFF2-40B4-BE49-F238E27FC236}">
                 <a16:creationId xmlns:a16="http://schemas.microsoft.com/office/drawing/2014/main" id="{EB737809-40E2-4144-A293-DFDA754BB657}"/>
               </a:ext>
             </a:extLst>
@@ -8198,7 +7360,7 @@
 </p:sld>
 </file>
 
-<file path=ppt/slides/slide24.xml><?xml version="1.0" encoding="utf-8"?>
+<file path=ppt/slides/slide22.xml><?xml version="1.0" encoding="utf-8"?>
 <p:sld xmlns:a="http://schemas.openxmlformats.org/drawingml/2006/main" xmlns:r="http://schemas.openxmlformats.org/officeDocument/2006/relationships" xmlns:p="http://schemas.openxmlformats.org/presentationml/2006/main">
   <p:cSld>
     <p:spTree>

</xml_diff>